<commit_message>
Se ha agregado dataset carros
</commit_message>
<xml_diff>
--- a/Clase3/MACHINE LEARNING - Clase 3.pptx
+++ b/Clase3/MACHINE LEARNING - Clase 3.pptx
@@ -29,10 +29,11 @@
     <p:sldId id="278" r:id="rId23"/>
     <p:sldId id="279" r:id="rId24"/>
     <p:sldId id="280" r:id="rId25"/>
-    <p:sldId id="281" r:id="rId26"/>
-    <p:sldId id="282" r:id="rId27"/>
-    <p:sldId id="283" r:id="rId28"/>
-    <p:sldId id="284" r:id="rId29"/>
+    <p:sldId id="285" r:id="rId26"/>
+    <p:sldId id="281" r:id="rId27"/>
+    <p:sldId id="282" r:id="rId28"/>
+    <p:sldId id="283" r:id="rId29"/>
+    <p:sldId id="284" r:id="rId30"/>
   </p:sldIdLst>
   <p:sldSz cx="12192000" cy="6858000"/>
   <p:notesSz cx="12192000" cy="6858000"/>
@@ -58,6 +59,241 @@
     </p:ext>
   </p:extLst>
 </p:presentation>
+</file>
+
+<file path=ppt/ink/ink1.xml><?xml version="1.0" encoding="utf-8"?>
+<inkml:ink xmlns:inkml="http://www.w3.org/2003/InkML">
+  <inkml:definitions>
+    <inkml:context xml:id="ctx0">
+      <inkml:inkSource xml:id="inkSrc0">
+        <inkml:traceFormat>
+          <inkml:channel name="X" type="integer" min="-1920" max="1920" units="cm"/>
+          <inkml:channel name="Y" type="integer" max="1080" units="cm"/>
+          <inkml:channel name="T" type="integer" max="2.14748E9" units="dev"/>
+        </inkml:traceFormat>
+        <inkml:channelProperties>
+          <inkml:channelProperty channel="X" name="resolution" value="72.86527" units="1/cm"/>
+          <inkml:channelProperty channel="Y" name="resolution" value="36.48649" units="1/cm"/>
+          <inkml:channelProperty channel="T" name="resolution" value="1" units="1/dev"/>
+        </inkml:channelProperties>
+      </inkml:inkSource>
+      <inkml:timestamp xml:id="ts0" timeString="2024-01-26T01:13:00.080"/>
+    </inkml:context>
+    <inkml:brush xml:id="br0">
+      <inkml:brushProperty name="width" value="0.05292" units="cm"/>
+      <inkml:brushProperty name="height" value="0.05292" units="cm"/>
+      <inkml:brushProperty name="color" value="#FF0000"/>
+    </inkml:brush>
+  </inkml:definitions>
+  <inkml:trace contextRef="#ctx0" brushRef="#br0">33849 13758 0</inkml:trace>
+  <inkml:trace contextRef="#ctx0" brushRef="#br0" timeOffset="3452.21">29492 9243 0,'36'0'156,"158"-35"-140,-89 35-16,336 0 15,141 0 1,-52 0-1,-231 0 1,-122 0 0,-160 0-1,19 0 110,-1 0-109,53 0 0,0 0-1,-52 0 1,-19 0-1</inkml:trace>
+  <inkml:trace contextRef="#ctx0" brushRef="#br0" timeOffset="6375.78">3440 10266 0,'70'0'94,"424"0"-63,1005-53 0,-334 53-15,-901 0-16,918 0 15,-212 0 1,-229 0 0,-159 0-1,-106 0 1,18 0-1,-388 0-15,211 0 16,-34 0 0,-36 0-1,35 0 1,-229 0-16,211 0 16,142 0-1,-318 0-15,265 0 16,106 0 15,-389 0-31,424 0 16,-441 0-1,53 0-15,123 0 16,142 0 0,-1 0-1,-300 0-15,248 0 16,-71 0-1,-53 0 1,35 0 0,-158 0-16,246 0 15,36 0 1,-53 0 0,53 0 15,-283 0-31,354 0 15,-336 0 1,141 0 0,-158 0-16,211 0 15,71 0 1,-36 0 0,18 0-1,0 0 1,18 0-1,-247 0-15,176 0 16,247 0 0,-123 0-1,88 0 1,-370 0-16,228 0 16,177 0-1,-405 0-15,317 0 16,-71 0-1,-17 0 17,-71 0-17,-211 0-15,88 0 16,-18 0 0,-88 0-16,52 0 15,1 0 1,35 0-1,71 0 1,35 0 0,71 0-1,-248 0-15,142 0 16,123 0 0,-53 0-1,0 0 1,36 0-1,-1 0 17,-246 0-32,88 0 15,35 0 1,-106 0 0,-18 0-1,-17 0 1,53 0-1,-35 0 1,-18 18 0,-36-18-1,1 0 1,17 0 0,142 0-1,-19 0 16,-122 0 1</inkml:trace>
+  <inkml:trace contextRef="#ctx0" brushRef="#br0" timeOffset="-136321.12">25259 15275 0,'18'0'0,"-18"18"16,17-18-16,1 0 15,35 0 17,53 0 14,-54 0-30,-34 0-16,0 0 16,35 0-1,0 0 1,17 0 0,107 0-1,69 0 1,-157 0-16,211 0 15,335 0 1,-177 0 15,18 0-15,-387 0-16,175 0 16,-193 0-16,123 0 15,123 0 1,-87 0-1,-19 0 1,-52 0 0,0 0-1,-142 0-15,124 0 16,89 0 0,-54 0-1,1 0 1,-72 0-1,-52 0 1,-35 0 15,0 0-15,-1 0 15,89 0-15,0 0-1,17 0 1,-87 0-16,17 0 16,-18 0-1,0 0 32,18 0-31,-18 0-16,18 0 15,18 0 17,-54 0-17,1 0 1,0 0-16,35 0 31,-18 0-15</inkml:trace>
+  <inkml:trace contextRef="#ctx0" brushRef="#br0" timeOffset="-131417.03">3440 16351 0,'35'0'47,"18"0"-16,123 0 0,18 0-15,212 0-1,158 0 1,89 0 0,-36 0-1,-493 0-15,246 0 16,124 0-1,-194 0 1,-18 0 15,36 0-15,-1 0 0,-246 0-16,211 0 15,-194 0-15,388 0 16,-17 0-1,-53 0 1,141 0 0,-459 0-16,511 0 31,-193 0-15,-124 0-1,1 0 1,-54 0-1,-17 0 17,-142 0-32,107 0 15,-142 0-15,229 0 16,54 0 0,-248 0-16,177 0 15,194 0 1,36 0-1,-354 0-15,177 0 16,247 0 0,-89 0-1,19 0 1,16 0 0,1 0-1,-370 0-15,229 0 16,105 0-1,89 0 17,-388 0-17,-71 0-15,229 0 16,124 0 0,-352 0-16,140 0 15,124 0 1,-106 0-1,70 0 1,36 0 0,0 0-1,-265 0-15,176 0 16,125 0 0,-107 0-1,-18 0 1,-193 0-1,123 0-15,35 0 32,-176 0-32,0 0 0,53-17 15,-53-1-15,159-35 16,-71 35 0,-18 18-1,124 0 1,0 0-1,53 0 1,-230 0-16,160 0 16,175 0 15,-369 0-31,17 0 0,17 0 0,36 0 16,123 0-1,-176 0-15,106 0 16,35 0-1,-53 0 17,18 0-17,17 0 1,-35 0 0,-88 0-16,265 0 15,-212 0 1,-89 0-16,142 0 15,88-17 1,-229 17-16,87 0 16,72 0-1,105 0 17,-247 0-32,195 0 15,-54 0 1,-17 0-1,-1 0 17,-122 0-32,87 0 15,1 0 1,-71 0 0,0 0-1,-18 0 1,0 0-1,-17 0 1,17 0 0,18 0-1,17 0 1,19 0 0,-54 0-1</inkml:trace>
+</inkml:ink>
+</file>
+
+<file path=ppt/ink/ink2.xml><?xml version="1.0" encoding="utf-8"?>
+<inkml:ink xmlns:inkml="http://www.w3.org/2003/InkML">
+  <inkml:definitions>
+    <inkml:context xml:id="ctx0">
+      <inkml:inkSource xml:id="inkSrc0">
+        <inkml:traceFormat>
+          <inkml:channel name="X" type="integer" min="-1920" max="1920" units="cm"/>
+          <inkml:channel name="Y" type="integer" max="1080" units="cm"/>
+          <inkml:channel name="T" type="integer" max="2.14748E9" units="dev"/>
+        </inkml:traceFormat>
+        <inkml:channelProperties>
+          <inkml:channelProperty channel="X" name="resolution" value="72.86527" units="1/cm"/>
+          <inkml:channelProperty channel="Y" name="resolution" value="36.48649" units="1/cm"/>
+          <inkml:channelProperty channel="T" name="resolution" value="1" units="1/dev"/>
+        </inkml:channelProperties>
+      </inkml:inkSource>
+      <inkml:timestamp xml:id="ts0" timeString="2024-01-26T01:20:11.877"/>
+    </inkml:context>
+    <inkml:brush xml:id="br0">
+      <inkml:brushProperty name="width" value="0.05292" units="cm"/>
+      <inkml:brushProperty name="height" value="0.05292" units="cm"/>
+      <inkml:brushProperty name="color" value="#FF0000"/>
+    </inkml:brush>
+  </inkml:definitions>
+  <inkml:trace contextRef="#ctx0" brushRef="#br0">7232 6579 0,'-124'0'31,"107"0"-16,-18 0-15,-1 0 16,1 0 15,0 0-15,-1 18 0,-16 123-1,52-106-15,-36 106 16,1 71-1,17-71 17,-35 0-17,36-88-15,-1 71 16,-35 105 0,36-176-16,-19 88 15,19-88-15,-36 70 16,53 19-1,0-54 1,0-18 0,53 1-1,0 35 1,-36-89-16,19 1 16,-1 53-16,88-1 15,-35-17 1,-17 0-1,35 0 1,-18 17 15,-53-52-31,89 17 16,35 18 0,17-17-1,36-19 1,-36 36-1,-17 0 1,-124-53-16,124 18 16,105-18-1,-52 0 1,-106 0 0,-71 0-16,89-53 31,-1-18-16,1-35 1,17 18 15,0 0-15,17-53 0,1 53-1,-123 52-15,69-52 16,89-53-1,-105 106 1,-54-36 0,53-70-1,-88-18 1,18 71 0,-71-71-1,-35-35 16,-1 36-15,72 158 0,-54-71-1,54 71-15,-1-35 0,0 17 0,-35-35 16,-52-70 0,-1 17-1,70 53-15,19 35 0,-36-35 16,-35-35-1,35-18 1,35 89-16,0-36 16,-34-18-1,16 36 1,-17 0 0,18 17 15,-35-17-16,70 17 1,-71 18-16,-88-35 31,71 0-15,-106-18 0,18 53-1,87 0 1,54 0-16,-35 0 15,-36 0 1,18 0 0,35 0-1,35 0-15,-17 17 16,-18-17 0,0 0-1,-18 0 1,-17 18-1,0 17 1,70-17 0,-35-18-1,36 0-15,-54 0 16,-140 0 0,140 18-1,53-18 48,-70 0-32,70 0 0,-17 0 32,-53 0-48</inkml:trace>
+  <inkml:trace contextRef="#ctx0" brushRef="#br0" timeOffset="2034.54">9066 10266 0,'-35'0'31,"70"0"-31,-88 0 16,-17 17 15,-248 178-16,-17 51 1,-17-34 0,105-18-1,35-53 1,177-105-16,-54 16 16,-52 107 15,124-124-31,-36 54 15,-265 175 17,318-228-32,-53 69 15,-17 160 1,52-230-16,1 36 16,-1 88-1,18 123 16,53-106-15,-36-123-16,125 159 16,-107-177-16,-18 0 15,54 36-15,123 70 32,-159-106-32,53 0 0,107 160 31,-160-178-31,318 230 31,158 0 0,-440-229-31,-18-18 0,141 53 16,0-18 0,-141-35-16,17 0 15,-17 0-15,159-53 16,423-123-1,-477 158-15,160-70 16,-124 35-16,265-88 16,52 0-1,-229 35 1,-229 70-16,35-52 16,-17-18-1,35-123 16,176-282 1,-264 440-32,35-35 0,-36-35 15,36-71 1,-35 142-16,-18-1 0,0-281 16,0 281-1,0-35-15,0-53 16,-18-35-1,-17 89 1,17 69-16,18 1 0,-35-18 16,-53-53-1,52 71-15,-69-18 16,52 18-16,17 17 16,-52-17-16,53 0 0,-247-106 31,211 105-31,-17 1 0,-494-212 31,529 229-31,0 1 16,-176-19-1,176 36 1,-18 0 0,36 0-16,-18 18 0,0-18 15,-264 88 1,246-70-16,1 0 0,-72 17 15,-140 35 1,229-52-16,0 0 0,-52-1 16,16 36-1,1 0 1,53-35-16,-212 141 31,-194 158 0,423-317-31</inkml:trace>
+  <inkml:trace contextRef="#ctx0" brushRef="#br0" timeOffset="35171.94">6015 7620 0,'0'-18'109,"17"-105"-93,-17 88-16,36-124 15,17-70 1,0 52 0,-36 54-1,1 123 110,0 194-109,-18-141-16,0 194 16,0 35-1,0-35 1,0-18-1,0-211-15,0 17 16</inkml:trace>
+  <inkml:trace contextRef="#ctx0" brushRef="#br0" timeOffset="35829.73">6068 8167 0,'17'0'63,"1"0"-48,53 17 1,-1-17 0,-52 0-16,35 0 15,0 0 1,0 0-1,-36 0 32</inkml:trace>
+  <inkml:trace contextRef="#ctx0" brushRef="#br0" timeOffset="37228.58">5962 12418 0,'0'-18'46,"35"-88"-14,36-17-1,-36 88-31,53-71 16,0 35-1,-35 71 1,-35 0-1,17 0 1,36 71 0,-36-36-16,71 141 15,-53-35 1,-35 18 0,-18 35-1,0-141-15,0 88 16,-18-105-16,-35 69 15,35-69-15,-70 52 16,18-18 15,-1-17-15,0-17 0,71-19-16,-35 1 15,0-18 1,17 0-16,36 0 94,70-35-79,-17-1 1,17 36-1,-18 18 17,72 53-17,-125-54-15,89 36 16,-53-18 0,-18 1-1,-17-36 95,35-36-95</inkml:trace>
+</inkml:ink>
+</file>
+
+<file path=ppt/ink/ink3.xml><?xml version="1.0" encoding="utf-8"?>
+<inkml:ink xmlns:inkml="http://www.w3.org/2003/InkML">
+  <inkml:definitions>
+    <inkml:context xml:id="ctx0">
+      <inkml:inkSource xml:id="inkSrc0">
+        <inkml:traceFormat>
+          <inkml:channel name="X" type="integer" min="-1920" max="1920" units="cm"/>
+          <inkml:channel name="Y" type="integer" max="1080" units="cm"/>
+          <inkml:channel name="T" type="integer" max="2.14748E9" units="dev"/>
+        </inkml:traceFormat>
+        <inkml:channelProperties>
+          <inkml:channelProperty channel="X" name="resolution" value="72.86527" units="1/cm"/>
+          <inkml:channelProperty channel="Y" name="resolution" value="36.48649" units="1/cm"/>
+          <inkml:channelProperty channel="T" name="resolution" value="1" units="1/dev"/>
+        </inkml:channelProperties>
+      </inkml:inkSource>
+      <inkml:timestamp xml:id="ts0" timeString="2024-01-26T01:21:06.128"/>
+    </inkml:context>
+    <inkml:brush xml:id="br0">
+      <inkml:brushProperty name="width" value="0.05292" units="cm"/>
+      <inkml:brushProperty name="height" value="0.05292" units="cm"/>
+      <inkml:brushProperty name="color" value="#FF0000"/>
+    </inkml:brush>
+  </inkml:definitions>
+  <inkml:trace contextRef="#ctx0" brushRef="#br0">6438 11183 0,'0'35'16,"0"-70"-16,0 159 15,18-89 1,-18 18 0,0-36-16,17 54 15,-17-1 1,0-52-16,0 70 16,0-35-16,0 71 15,0 52 1,0 18-1,0 0 17,0-141-32,18 71 15,17 34 17,1-52-17,-1-18 1,0-17-1,-35-36-15,0 18 16,36 18 0,-36-1-1,35 1 1,0-18 0,0 17-1,-35-52-15,53 35 16,-17 17-1,-19-34 1,18 34 0,18 1-1,0-1 1,-17 1 0,-19-54-16,-17 1 0,18 0 0,-1-18 15,1 35-15,0 0 16,70 18-1,-18 0 1,36 35 0,35 1-1,53-1 1,-158-88-16,123 53 16,-107-53-16,1 17 15,88 1-15,1 17 16,-1 0-1,-36 1 17,-69-36-32,17 17 15,-36-17 1,1 0 0,0 0 15,35 0-16,-36 0-15,1 0 16,-1 0 0,1 0-1,35 0 17,-18 0-17,1 0 48</inkml:trace>
+  <inkml:trace contextRef="#ctx0" brushRef="#br0" timeOffset="1690.72">6438 11412 0,'0'-53'109,"159"-158"-93,-106 123-16,70-1 16,212-122-1,-105 52 1,-1 18 0,0-18-1,-70 71 1,-106 70-16,88-35 15,194-17 17,-264 52-32,229-70 15,88 70 1,-88 18 0,-71 0-1,-194 0-15,71 18 16,-35 17-1,-1 18 1,89 35 0,53 53-1,52 18 1,-193-106-16,158 88 16,-53 0-1,1-17 1,-54-36-1,-35 18 1,1 17 15,-72-70-31,36 35 16,71 177 0,-71-53-1,17-1 1,-35-17-1,1-35 1,-36-106-16,17 53 16,-17 0-1,0-18 1,-17 0 0,-19 0-1,-16-17 1,52-53-16,-71 52 15,-17 89 1,0-53 15,35-1-15,0-34 0,0-18-1,35-53-15,-35 35 16,-88 53-1,18-17 1,17 0 0,-53-36-1,-17 0 1,123-17-16,-141 35 16,-159 52-1,88-52 1,71 0-1,53-17 1,-53 17 15,106-36-15,-53-17 0,35 0-1,71 0 1,17 0-1,-52 0 48,-89 35-32,141-35 0</inkml:trace>
+  <inkml:trace contextRef="#ctx0" brushRef="#br0" timeOffset="3686.22">8802 9807 0,'-35'0'62,"-54"0"-46,-17 0 0,-17 35-1,88-17 1,-1-18-1,-87 35 1,-124 18 15,159-53-31,-265 18 16,-317-18 0,335 0-1,176-35 1,35 17-1,54-35 1,52 53-16,-88-88 16,-70-53-1,35-36 1,0-17 0,17 18-1,71 17 1,36 106-16,-1-52 15,18-90 17,18 37-17,52-36 1,107-18 0,-1-35-1,-105 159-15,123-159 16,229-141-1,-88 141 1,-17 71 0,-71 34-1,-18 90 1,-159 52-16,142-36 16,-106 36-16,282 0 15,53 0 1,-35 0-1,-54 0 1,19 36 15,70 87-15,-177-35 0,-34 36-1,-89-18 1,-18 17-1,-123-105-15,71 87 16,52 89 0,-87-141-16,122 177 15,-52-36 1,-35-106 0,-36-35-1,-35-35 1,0 52-1,0-17-15,0 123 32,-53 36-17,0 17 1,0-70 0,-35-53-1,18 0 1,52-71-16,-35 36 15,-88 17 1,17 18 0,-87-1-1,17-52 1,-71 36 0,195-72-16,-354 71 15,-317-17 16,18-53-15,318-18 15,281 0-31,-423 0 16,459 0 0,-18 0-1,89 0 1</inkml:trace>
+  <inkml:trace contextRef="#ctx0" brushRef="#br0" timeOffset="10379.95">15081 6174 0,'-53'0'16,"36"0"0,-1 0-1,-17 0 1,-1 0-1,-16 0 1,-1 0 15,35 0-31,0 0 16,-140 88 0,17 35-1,-53 89 1,52 17-1,19-35 1,88-141 0,-36 53-1,53-53-15,-34 53 16,-37 35 0,89-71-1,-17 36 1,-19 18-1,19-18 1,17-71-16,-36 106 16,-34 124-1,35-54 1,35-34 0,0-36-1,35-35 1,-35-89-16,35 89 15,-17-106-15,35 71 16,0 17 15,-36-53-31,36 53 16,53 36 0,-35-36-1,-54-53-15,54 36 16,-54-71-16,72 70 15,17 1 1,-1-1 0,-16-34-1,-89-19-15,88-17 16,18 0 0,-89 18-16,107 0 15,17-18 1,18 0-1,70 0 17,-159 0-32,177 0 15,36 0 1,-213 0-16,230-36 16,17-34-1,-52-36 1,0 53-1,-195 35-15,142-35 16,17 1 0,-158 34-16,158-35 15,-35-18 1,-70 36 0,-36 0-1,-71 35 1,1-18-16,0 1 0,-1-1 0,54-35 15,35-17 17,123-72-1,-176 54-15,-53 71-16,53-36 15,0-53 1,-36 71-16,36-54 15,18-34 1,-36 17 0,0-17-1,-35 87-15,36-87 16,-1 17 0,-35-17-1,18 34 1,17 19-1,-35 17 1,0 0 15,0 18-31,-35-18 16,-18-53 0,-36-18-1,1 19 1,-18-19-1,-17 18 1,88 89-16,-89-36 16,107 35-16,-195-35 15,-17-17 1,-18 70 0,70 0-1,160 0-15,-89 0 16,0 0-1,88 0-15,-70 0 16,-35 0 15,-36 0-15,-35 0 0,141-18-16,-123-17 15,105 17-15,-105-17 16,123 35-16,-177-88 15,54-18 1,105 88 0,54 0-1,-1 18 17,-105 0-17,-18 0 1,-71 0-1,-35 0 1,53 0 15,176 0-31,-88 0 16,-17 0 0,35 36-1,0-1 1,17-17-1,36-1 1,17-17 0</inkml:trace>
+  <inkml:trace contextRef="#ctx0" brushRef="#br0" timeOffset="12017.53">15787 9984 0,'-71'105'47,"36"-34"-31,0-18-16,-71 176 15,-35 1 1,0-1 0,52 53-1,72-211-15,-18 105 16,17-123-16,-53 159 16,54-142-16,-72 248 15,19-19 1,52 1-1,18-35 1,0-194 0,18 123-1,0-124-15,34 124 16,72 141 0,-71-105-1,17-36 1,19-18-1,-36-53 1,-18-87-16,18 17 16,53 70-1,-36-17 1,54 17 0,52 19-1,36-19 16,-159-88-31,35 18 0,123 35 32,-17-70-17,-17-18 1,-18-35 0,52-18-1,-175 35-15,105-88 16,-106 71-16,53-71 15,18-35 1,-35-53 0,-36-18-1,-18 160-15,1-107 16,0 88-16,-18-140 16,0-178-1,-36 54 1,-52 53-1,0 18 17,-35-36-17,87 247-15,-52-124 16,-71-34 0,1-19-1,52 89 1,88 106-16,-88-106 15,89 106-15,-89-89 16,-18-88 0,89 160-16,0-19 0,-124-158 15,0-1 1,89 72 0,-1 69-1,71 72-15,-53-18 31,53 17-31,-17 0 0</inkml:trace>
+  <inkml:trace contextRef="#ctx0" brushRef="#br0" timeOffset="13267.14">17074 9648 0,'-17'0'15,"-18"124"16,35 193 1,123 72-17,0 157 1,-70-440-16,-17 0 0,-1 0 16,35 0-16,177 335 15,-211-388-15,52 105 16,71 72-1,-1-36 1,-16 0 0,-37-71-1,-52-52 1,-35-71-16,17 35 16,18 0-1,0 1 1,53-36-1,53 17 17,35-17-17,-159 0-15,159 0 16,53 35 0,-106 18-1,-88-53 1,0 0-1,17-70 1,-34 35-16,52-71 16,53-141-1,-18 53 1,-34 17 0,-54 1-1,35-71 16,-52 194-31,53-353 16,-54 159 15,-17 71-15,-35-53 0,0 158-16,-18-140 15,-18-89 1,36 247-16,-53-159 15,-36 0 1,1 89 0,-1-36-1,89 124-15,-71-36 16,-17-17 0,70 53-16,-141-53 31,-35 17-16,158 71 1,0-18 15,36 18-31,-71 0 16,-194 36 0,-17 52-1,158-53-15</inkml:trace>
+  <inkml:trace contextRef="#ctx0" brushRef="#br0" timeOffset="16617.79">26088 6632 0,'0'0'0,"-71"-17"31,54 17-31,-19-36 16,-52-17 0,53 36-1,-141-107 1,-36 54-1,-141-1 1,212 18-16,-282-53 16,-318-70-1,318 105 1,229 71 0,123 0-1,18 18 1,35 0-16,-123 52 31,106-34-31,-318 193 31,124-88-15,53 18 0,140-124-16,-175 177 15,211-159 1,-36-18-16,-70 124 15,-17 17 1,52 0 0,54-123-16,-36 194 15,0 0 1,35 106 0,18-71-1,0-211-15,0 35 16,0-89-1,0 19-15,0-19 0,53 36 16,0-18 15,18 18-15,52 18 0,107 17-1,-125-70-15,213 70 16,370-70-1,-71-18 1,-17-177 0,-477 124-16,18 18 0,89-18 15,122-141 1,-105-88 0,-194 229-16,141-247 15,-17 35 1,-36 18-1,-71 0 1,1 18 15,-53 70-15,-18 124-16,0-159 16,0 0-1,0-70 1,0 52-1,0 159-15,0-53 16,0 71 0</inkml:trace>
+  <inkml:trace contextRef="#ctx0" brushRef="#br0" timeOffset="18484.08">27340 8026 0,'-17'0'16,"-19"0"0,19 0-16,-36-36 62,35 36-46,-123 0-1,-71 0 1,142 0-16,-159 0 16,-160 124-1,54-89 1,88 53-1,53-35 1,71 35 15,70-70-31,-106 88 16,-176 106 0,-18 17-1,89-17 1,211-195-16,-106 124 15,106-105-15,-35 69 16,-18-16 0,88-54-16,-17 35 15,-53 54 17,70-106-32,18 17 0,-17-18 0,-71 72 15,52-19 1,36-52-16,-17 0 15,17-1 17,-18-17-17,18 71 1,0-18 0,0 17-1,0-52-15,35 88 16,89 105-1,105 36 1,-88-106 0,-88-105-16,106 52 15,35 35 1,-141-87-16,229-19 31,335-140-15,-246 17-1,-54 35 17,-70 18-17,-176 18 1,-18-18 0,0-35-1,-1 0 1,-16-36-1,-19-34 1,1 122-16,35-122 16,18-125-1,34 19 1,1 35 0,35 17-1,-17 35 1,-107 142-16,-17-18 15,36-17-15,-36 17 0,53-106 32,-36 36-17,-17-19 1,0 37 0,0 69-16,0-17 15,0 36-15</inkml:trace>
+  <inkml:trace contextRef="#ctx0" brushRef="#br0" timeOffset="20670.18">23936 11271 0,'-18'0'16,"1"0"15,-1 0-15,0 0 0,-17 0-1,-18 0 16,0 0-15,18 0 15,-53 0-15,88 18-16,-141 52 16,-18 54-1,124-106-15,-18 34 16,-53 72-1,35-1 1,1 1 0,52-36-1,-35 36 1,18 17 0,0 53-1,-1-141-15,1 105 16,35-105-16,-17 106 15,17 70 17,0 1-17,0-19 1,0-52 0,35-35-1,-18-107-15,36 36 16,0 18-1,0 17 1,18 18 0,35 17-1,17 1 1,-88-89-16,54 18 16,-54-36-16,71 72 15,-18-54 1,-18 18-1,1 0 17,-53-53-32,52 35 15,1-35 1,123 18 0,88-71-1,124-53 1,-159 53-1,-89-53 1,-122 89-16,-1-54 16,0-70-1,0 35 1,1-53 0,-19-52-1,-17 17 1,0 141-16,0-88 15,-70-142 17,52 230-32,18-370 31,-35 158-15,0 213-1,-1-90 1,19 107-16,-1-88 15,-35-36 1,18 18 0,0 35-1,-18 35 1,-36-17 0,72 71-16,-54-36 15,-17-18 1,0 36-1,0 0 1,35-1 15,-88 1-15,123 17-16,-70 1 16,-89-36-1,19 0 1,105 53-1,35 0 64,-35 0-48</inkml:trace>
+  <inkml:trace contextRef="#ctx0" brushRef="#br0" timeOffset="22765.56">26494 10813 0,'-36'0'47,"19"0"-16,-1 0-15,-17 0 0,-18 0-1,-35 35 1,52 0-16,-105 36 15,-17 35 1,34-18 0,18 0-1,71-70-15,-18 35 16,18-1 0,-18 54-1,0-18 1,18 36-1,17-106 1,0 70-16,1-18 31,17 54-15,0-71-16,0 70 16,0 18-1,0-17 1,0 35-1,0-124-15,0 88 16,17-70-16,19 71 16,52 105-1,-35-35 1,35-18 0,0-35-1,0-17 1,-70-89-16,35 53 15,-35-52-15,34 52 32,1-18-17,0 1 1,0-18 0,-35-53-16,17 35 15,-17-35-15,17 18 16,36-18-1,17 0 1,35 0 0,-70-18-16,124-35 15,122-53 1,37-70 0,-266 123-16,142-70 15,-53-1 1,-89 71-1,-35-35 17,-17 70-32,-18-52 15,0-89 1,18-35 0,17-35-1,35-18 1,-17-71-1,-53 265-15,0-70 16,0 52-16,0-123 16,-35-105-1,0 105 1,0 35 0,17 141-16,0-35 15,1-17 1,-19 34-1,-34-52 17,52 53-32,-35-53 15,-35-53 1,17 52 0,54 72-16,-36-54 15,18 36 1,-1 17-1,-34-17 1,-18 17 0,35 1-1,-18 17 1,36 0-16,-36 0 16,-17 0-1,18 17 1,-19 19-1,19 34 17,-71 1-17,123-36-15,-88 18 16,-53 70 0,107-87-1,34-1 1,0-17-1,18-1 32,-70 71-31,52-35 0,18-35-1</inkml:trace>
+</inkml:ink>
+</file>
+
+<file path=ppt/ink/ink4.xml><?xml version="1.0" encoding="utf-8"?>
+<inkml:ink xmlns:inkml="http://www.w3.org/2003/InkML">
+  <inkml:definitions>
+    <inkml:context xml:id="ctx0">
+      <inkml:inkSource xml:id="inkSrc0">
+        <inkml:traceFormat>
+          <inkml:channel name="X" type="integer" min="-1920" max="1920" units="cm"/>
+          <inkml:channel name="Y" type="integer" max="1080" units="cm"/>
+          <inkml:channel name="T" type="integer" max="2.14748E9" units="dev"/>
+        </inkml:traceFormat>
+        <inkml:channelProperties>
+          <inkml:channelProperty channel="X" name="resolution" value="72.86527" units="1/cm"/>
+          <inkml:channelProperty channel="Y" name="resolution" value="36.48649" units="1/cm"/>
+          <inkml:channelProperty channel="T" name="resolution" value="1" units="1/dev"/>
+        </inkml:channelProperties>
+      </inkml:inkSource>
+      <inkml:timestamp xml:id="ts0" timeString="2024-01-26T01:23:35.048"/>
+    </inkml:context>
+    <inkml:brush xml:id="br0">
+      <inkml:brushProperty name="width" value="0.05292" units="cm"/>
+      <inkml:brushProperty name="height" value="0.05292" units="cm"/>
+      <inkml:brushProperty name="color" value="#FF0000"/>
+    </inkml:brush>
+  </inkml:definitions>
+  <inkml:trace contextRef="#ctx0" brushRef="#br0">22983 12524 0,'-88'17'94,"-18"160"-78,71-142-16,-53 106 15,-88 106 1,34-35 15,54-71-15,18 17 0,-18 1-1,70-123-15,-35 69 16,-53 89-1,18-17 1,53-89 0,35-53-16,-36 53 15,19-70-15,17 53 16,-18-1 0,0-35-16,18-17 15,-17 70-15,-1 0 16,-35-35-1,36 36 17,-1-54-32,0 18 0,1 35 31,-1-70-31,-35 105 16,36 1-1,-19-36 1,19-53-1,17-17-15,0-1 16</inkml:trace>
+  <inkml:trace contextRef="#ctx0" brushRef="#br0" timeOffset="1700.13">21043 15681 0,'18'0'125,"-1"0"-110,36 0 1,18 18 0,17-18-1,18 0 1,-53 0 0,-18 0-1,18 17 1,-35-17 31,-1 0-32,1 0 1,17 18 0,-17-18-1,0 0 16,-1 0-15,-52 0 93,-53 18-77,-71 176-1,141-159-15,1-18-16,-1 19 15,0 34 1,1-70-16,17 71 94,0 17-79,-36-88 1,36 18-1,0-1 17,0 1-17,-17-18 63,17-53-62,0 18-16,-35-106 16,-1-53-1,-17 70 1,36 71 0,17 18-1,-18 35 79,0-35-47,1 17-32,-1 0 1,1 18 0</inkml:trace>
+  <inkml:trace contextRef="#ctx0" brushRef="#br0" timeOffset="2849.98">21590 13670 0,'-53'53'31,"-17"71"-15,34-107-16,19 18 0,-54 107 15,-52 16 1,34 1 0,19-71-1,52-17 1,1-71-1,-19 17-15,-17 89 32,18-70-17,0 34 1,-18-17 0,53-18-16,-53 18 15,35-35-15,-17 17 16,17 18-1,-17-18 1,0 1 0,17-19-1,-17 1 1,17 0 0,18-1 46,-17-17-31,-1 0-15</inkml:trace>
+  <inkml:trace contextRef="#ctx0" brushRef="#br0" timeOffset="4020.25">20249 14676 0,'18'17'94,"35"71"-63,-35-52-31,-18-1 16,17 71 0,-17-71-16,0 53 15,18 0 1,0-17-1,-1-53 1,-17-1-16,0 1 16,-35-18 109,0 0-94,17 0-31,0 0 16,-17 0-1,0 0 1,17 0-1,-17 0 1,17 0 78,1-106-63,17 88-31,17-140 31,1 122-15,0 1-16,17-18 16,18 0-1,-53 36 1,35 17-1</inkml:trace>
+</inkml:ink>
+</file>
+
+<file path=ppt/ink/ink5.xml><?xml version="1.0" encoding="utf-8"?>
+<inkml:ink xmlns:inkml="http://www.w3.org/2003/InkML">
+  <inkml:definitions>
+    <inkml:context xml:id="ctx0">
+      <inkml:inkSource xml:id="inkSrc0">
+        <inkml:traceFormat>
+          <inkml:channel name="X" type="integer" min="-1920" max="1920" units="cm"/>
+          <inkml:channel name="Y" type="integer" max="1080" units="cm"/>
+          <inkml:channel name="T" type="integer" max="2.14748E9" units="dev"/>
+        </inkml:traceFormat>
+        <inkml:channelProperties>
+          <inkml:channelProperty channel="X" name="resolution" value="72.86527" units="1/cm"/>
+          <inkml:channelProperty channel="Y" name="resolution" value="36.48649" units="1/cm"/>
+          <inkml:channelProperty channel="T" name="resolution" value="1" units="1/dev"/>
+        </inkml:channelProperties>
+      </inkml:inkSource>
+      <inkml:timestamp xml:id="ts0" timeString="2024-01-26T01:58:55.599"/>
+    </inkml:context>
+    <inkml:brush xml:id="br0">
+      <inkml:brushProperty name="width" value="0.05292" units="cm"/>
+      <inkml:brushProperty name="height" value="0.05292" units="cm"/>
+      <inkml:brushProperty name="color" value="#FF0000"/>
+    </inkml:brush>
+    <inkml:brush xml:id="br1">
+      <inkml:brushProperty name="width" value="0.05292" units="cm"/>
+      <inkml:brushProperty name="height" value="0.05292" units="cm"/>
+      <inkml:brushProperty name="color" value="#00B050"/>
+    </inkml:brush>
+    <inkml:brush xml:id="br2">
+      <inkml:brushProperty name="width" value="0.05292" units="cm"/>
+      <inkml:brushProperty name="height" value="0.05292" units="cm"/>
+      <inkml:brushProperty name="color" value="#002060"/>
+    </inkml:brush>
+  </inkml:definitions>
+  <inkml:trace contextRef="#ctx0" brushRef="#br0">13882 12823 0,'0'0'16,"-18"89"-16,18-72 0,-35 36 16,35 18-1,-18-71-15,1 17 16,-19 36 78,19 0-79,17-17-15,-53 52 16,0 0 0,18 53-1,-1 0 1,36-17-1,0-19 1,0-69-16,0 70 16,0 17-1,0 18 1,0 0 0,0 0-1,0 0 16,0-123-31,0 141 16,0-36 0,36-17-1,-19-18 1,1 1 0,-18-19-1,17-52-15,1 35 16,0 17-1,17 1 1,-17-1 0,-1 1-1,19-1 1,34 19 0,1-19 15,-18 36-16,17-35 1,-17-19 0,18 19-1,-54-53-15,72 35 16,-1 0 0,53 17-1,0-17 1,-18-35-1,-52 17 1,-36-35 0,0 0-1,36 0 1,0-18 0,34-17 15,37-18-16,-107 35-15,53 1 16,71-54 0,-36 1-1,-35-19 1,36-16 0,-71-36-1,-18 105-15,0-52 16,1-53-1,-36 123-15,0-70 16,0-18 0,0-70-1,0-36 1,0 142-16,0-195 16,0 18 15,0 18-16,0 35 1,0 0 0,0 35-1,0 124-15,0-106 16,0-53 0,-18 70-1,-17 18 1,17 53-1,-17-35 1,0 53-16,-1-18 16,-52-53-1,0-35 1,17 35 0,18 36-1,18 34 16,35 19-15,-17 17 78,-160 0-79,-105 0 1,-18 0 0,88 0-1,89 0 1,105 0-16,1 0 78,-1 0-62,0 17-1,-70 36 1,18-17 0,-1 17-1,36-18 1,17-35 15,18 17-15,-18 19-1,-17 17 1,35 0 0,-53-18 15,53-18-31,-17 1 15,17 0-15,-18-18 79,0 17-64,1 1 16,-1-18 1,0 0 61,1 0-61</inkml:trace>
+  <inkml:trace contextRef="#ctx0" brushRef="#br1" timeOffset="12968.81">10231 16475 0,'-18'0'31,"0"0"-15,1 0 0,-19 0 15,19-18-16,17 0-15,-53-17 32,0-35-17,53-36 1,-53-18 15,53 89-31,-53-18 16,35 35-16,-17-52 15,0-106 1,-36-89 0,54 194-1,-19-52 1,19-1 0,17 89-16,0-71 15,0-70 1,0 52-1,0-34 1,0 34 0,17-17-1,1 88-15,17-70 16,-17 105-16,17-141 16,18 1 15,0 52-16,-18 18 1,18-18 0,18-18-1,17 36 1,18-106 0,17 18-1,-34 52 1,52 1-1,0-18 17,-124 105-32,177-70 15,-123 71 1,-53 18 0,-1 17 46,18 0-46,36 17-1,35 18 1,-36-17 0,-17 0-1,-35-1-15,53 36 16,-1 0-1,1 0 1,35 71 0,-1 34-1,-16-16 1,-72-107 0,89 124-16,-71-18 31,1-18-16,-36 1 1,35-54 0,-18 36-1,-17-53-15,0 70 16,-17 18 0,-36-35-1,53 0 1,-35 0-1,17 17 1,18-105-16,-35 88 16,-1 53-1,36-71 1,-17-35 15,17 0-15,0-36-1,0 36 1,0 0 0,-18-18-1,1 36 1,-1-53-16,18 17 16,0-17-16,-18 17 15,1 71 1,-1-53-1,0 0 1,1-1 0,-19-16-1,19-19 1,-1 19 0,1-19 15,-19 19-16,1-19 1,0 18 0,-18-17-1,17 53 1,-16-36 0,-1 0-1,0-17 1,17 17-1,19-35-15,-36 35 16,0-17 15,18-18-31,17 18 0,-70-1 16,17-17 15,54 0-31,-72 36 16,-16-19-1,69 1-15,-52 17 16,18-35 0,52 18-1,-17-18 1,17 0 0,-17 0 46,17 0-31,-17 0 1,-18 0-1</inkml:trace>
+  <inkml:trace contextRef="#ctx0" brushRef="#br2" timeOffset="22799.09">13053 16475 0,'-53'0'31,"35"0"-15,-70 0 0,0 0-1,53 0 1,17 0-1,-70-124 64,-106-246-48,53 88-16,-36-18 1,89-53 0,17 53-1,54 230-15,-18-107 16,17-105 0,18 123-1,0-17 1,0 123-16,0-53 15,0 71-15,0-106 16,0 105-16,0-87 16,0-89-1,0 36 1,53 17 15,-36 124-31,36-124 0,-35 89 16,35-125-1,-35 125-15,34-212 16,107-53 0,-18 88-1,18 17 1,-141 195-16,-1 0 0,19-1 16,-1 1-1,-35 18 1,70-54 31,54-17-32,-71 70-15,88-70 16,-106 70-16,89-17 31,176-53-15,-71 35-1,53 35 1,-229 18-16,88 0 16,124 18-1,-195 0-15,89 52 16,35 36 0,-88-35-1,-53-1 1,141 159 15,70 124-15,-34-88 15,-142-124-15,-70-106-16,70 89 15,-71-71-15,36-1 16,-35 54-1,0-106-15,34 88 16,-16-17 0,-19 17-1,1 18 1,-18 70 0,35 54-1,-35-195-15,53 141 16,-17-34-1,-19-19 1,-17-17 0,0-53-16,0 53 15,0 88 1,0-141-16,0 88 16,0 53 15,0-106-16,0 35 1,0-105-16,-17 88 16,-1-71-16,-17 89 15,17-72-15,-35 125 16,18-18 0,17-89-1,0-17 1,1-35-16,17 17 15,-106 71 1,88-71-16,-17 36 16,-18 17-1,0-18 1,18-17 15,17-35-15,-17 17-1,17-35-15,-17 36 16,-35 16 0,-1-16-1,-17 17 1,53-36-16,-18 19 16,-18 16-1,18-16 1,-35-19-1,0-17 1,17 18 0,-17 0-1,-53-18 1,123 0-16,-70 0 16,-71 0 15,54 0-16,-1 0 1,70 0-16,-52 0 16,-18 0-1,71 0-15,-53 0 16,0 0 0,17 0-1,1 0 1,52 0-16,-53 0 15,1 0 1,-36 0 0,53 0-1,0 0 1,18 0 15,17 0-15,1 0 31,-19 0-32,1 0 1,-35 0 0,70 17-16,-53-17 15,-18 36 1,-17-19-1,53-17 1,-1 0 0,19 0 46,-19 36 16,19-36-62,-19 0 0,1 0-1,53 0 126</inkml:trace>
+</inkml:ink>
+</file>
+
+<file path=ppt/ink/ink6.xml><?xml version="1.0" encoding="utf-8"?>
+<inkml:ink xmlns:inkml="http://www.w3.org/2003/InkML">
+  <inkml:definitions>
+    <inkml:context xml:id="ctx0">
+      <inkml:inkSource xml:id="inkSrc0">
+        <inkml:traceFormat>
+          <inkml:channel name="X" type="integer" min="-1920" max="1920" units="cm"/>
+          <inkml:channel name="Y" type="integer" max="1080" units="cm"/>
+          <inkml:channel name="T" type="integer" max="2.14748E9" units="dev"/>
+        </inkml:traceFormat>
+        <inkml:channelProperties>
+          <inkml:channelProperty channel="X" name="resolution" value="72.86527" units="1/cm"/>
+          <inkml:channelProperty channel="Y" name="resolution" value="36.48649" units="1/cm"/>
+          <inkml:channelProperty channel="T" name="resolution" value="1" units="1/dev"/>
+        </inkml:channelProperties>
+      </inkml:inkSource>
+      <inkml:timestamp xml:id="ts0" timeString="2024-01-26T02:00:21.866"/>
+    </inkml:context>
+    <inkml:brush xml:id="br0">
+      <inkml:brushProperty name="width" value="0.05292" units="cm"/>
+      <inkml:brushProperty name="height" value="0.05292" units="cm"/>
+      <inkml:brushProperty name="color" value="#002060"/>
+    </inkml:brush>
+  </inkml:definitions>
+  <inkml:trace contextRef="#ctx0" brushRef="#br0">13899 7003 0,'-17'0'47,"70"0"-16,0 0-15,0 0-1,-18 0 1,-18 0-16,36 0 16,53 0 15,53 35-16,88-35 1,-124 0-16,248 0 16,281 0-1,-34 0 1,-459 0-16,352 0 16,-176 0-1,-105 0 1,-107 0-1,-105 0-15,35 0 16,-36 0-16,18 0 16,107-53-1,157 18 17,195-53-17,-229 88 16,-18 0-15,-106 0 0,-35 0-1,-18 0 1,35 0 0,-87 0-16,70 0 15,105 0 1,-158 0-16,159 0 15,-18 0 1,-53 0 0,-106 0 15,-17 0 16,0 0-16,34 0 0,-16 35-15,34 18 0,-34-53-1,-19 17 1</inkml:trace>
+  <inkml:trace contextRef="#ctx0" brushRef="#br0" timeOffset="1558.51">23142 11042 0,'36'0'78,"-1"0"-62,0 0-1,71 0 1,247 0 15,881 0 1,-1110 0-32,599 0 31,-370 0-16,-106 0 1,35 0 0,18 0-1,-230 0-15,213 0 16,105 0 0,-141 0-1,17 0 1,1 0-1,-1 0 1,-211 0-16,124 0 16,123 0-1,-89 0 1,-34 0 0,-19 0 15,-52 0-16,-88 0-15,17 0 16,53 0 0,-17 0-1,35 0 1,-18 0 0,0 0-1,-53 0 1,-17 0-1</inkml:trace>
+  <inkml:trace contextRef="#ctx0" brushRef="#br0" timeOffset="15011.58">14728 5697 0,'18'53'125,"-18"53"-110,0-53-15,0-18 0,0 142 16,0 52 0,0-70-1,0-53 1,0-89-16,0 19 15,0-19 1,0 1-16,0-1 16,0 89 249,0 124-249,0-178-16,-18-16 16,1 17-16,17-18 0,-18 71 15,-17 88 1,17-35-1,18-71 1,0-53 0,0-17 15</inkml:trace>
+  <inkml:trace contextRef="#ctx0" brushRef="#br0" timeOffset="16207.99">17851 5927 0,'0'53'109,"0"176"-93,0-159-16,0 124 16,0 89-1,0-230-15,0 105 16,17 72-1,18-160 1,-35 1 0,0-54-16,0 19 15,0 70 17,0 17-1,0-52-16,0 17 1,0-35 0,0-36-16,18 1 15,0 0-15,-18-1 16</inkml:trace>
+  <inkml:trace contextRef="#ctx0" brushRef="#br0" timeOffset="19889.91">24183 10142 0,'0'18'141,"0"53"-110,18-1-15,17 71-1,-35 18 1,0-36 0,0-105-16,0 70 15,0 18 1,17-35 0,1-18-1,-18-1 1,0 1-1,0 0 1,0 0 0,0-17-16,0 16 15,0 19 1,0 0 0,0 17 15,0-53-31,0 0 15,0 1 1</inkml:trace>
+  <inkml:trace contextRef="#ctx0" brushRef="#br0" timeOffset="21177.2">26405 10407 0,'0'53'94,"0"70"-78,0-17-1,36 18 1,-19-89-16,1 53 15,0 18 1,-1-53 0,-17 35-1,0-70-15,0 35 16,0-18 0,0-17-16,0 17 15,0-18 16,0 36 16,0-35-31,0 0-16,0-1 16,0 1-1,0 0 1</inkml:trace>
+  <inkml:trace contextRef="#ctx0" brushRef="#br0" timeOffset="22140.57">28310 10160 0,'18'88'63,"-18"89"-47,0-36 15,0-35-16,0-71-15,0 71 16,0-36 0,0 1-1,0 17 1,0-18 0,0-52-16,0 0 0,0-1 15,0 19-15,0 17 16,0 0-1,18-18 1,-18 18 0,17-18-1,-17 18 1,0-35-16,18 52 31,-18 1-31,18-18 31,-1-18-15,-17-17 0</inkml:trace>
+</inkml:ink>
+</file>
+
+<file path=ppt/ink/ink7.xml><?xml version="1.0" encoding="utf-8"?>
+<inkml:ink xmlns:inkml="http://www.w3.org/2003/InkML">
+  <inkml:definitions>
+    <inkml:context xml:id="ctx0">
+      <inkml:inkSource xml:id="inkSrc0">
+        <inkml:traceFormat>
+          <inkml:channel name="X" type="integer" min="-1920" max="1920" units="cm"/>
+          <inkml:channel name="Y" type="integer" max="1080" units="cm"/>
+          <inkml:channel name="T" type="integer" max="2.14748E9" units="dev"/>
+        </inkml:traceFormat>
+        <inkml:channelProperties>
+          <inkml:channelProperty channel="X" name="resolution" value="72.86527" units="1/cm"/>
+          <inkml:channelProperty channel="Y" name="resolution" value="36.48649" units="1/cm"/>
+          <inkml:channelProperty channel="T" name="resolution" value="1" units="1/dev"/>
+        </inkml:channelProperties>
+      </inkml:inkSource>
+      <inkml:timestamp xml:id="ts0" timeString="2024-01-26T02:00:55.878"/>
+    </inkml:context>
+    <inkml:brush xml:id="br0">
+      <inkml:brushProperty name="width" value="0.05292" units="cm"/>
+      <inkml:brushProperty name="height" value="0.05292" units="cm"/>
+      <inkml:brushProperty name="color" value="#002060"/>
+    </inkml:brush>
+  </inkml:definitions>
+  <inkml:trace contextRef="#ctx0" brushRef="#br0">9208 11518 0,'35'0'141,"247"-35"-94,124-53-16,-283 70-16,-88 18 1,36 0 62,158 106-62,-193-106-1,246 70 17,53 19-1,-247-72 0,0 1 79,124 35-79,-177-53-31,18 18 0,229-1 15,-70 1 1,-36-18 0,-105 0-1,-36 0 1,-17-53 171,88-106-155,-71 141-17,36-34 17</inkml:trace>
+  <inkml:trace contextRef="#ctx0" brushRef="#br0" timeOffset="3063.56">9172 11571 0,'-17'-18'157,"-19"18"-142,19 0 1,-1 0-1,0 0 1,1 0 0,-19 0 15,-105 0 0,-300 71 0,71-53-15,158-18 0,124 17-1,70-17-15,18 18 16,-52-18 0,34 18-1,0-18-15,-123 17 16,0 19-1,35-19 1,0 18 0,53-17-1,1-18 1,-1 18 0,-18-18 15,53 0-31,-70 0 15,-18 0 1,71 0 0,18 0-1,-19 0 32,-34 0-31,34 0-16,-52 0 15,71 0-15,-177 0 32,52 0-17,89 0 1,-17 0 0,-89 0-1,0 0 16,107 0-31,-142 0 16,52 0 0,72-18-1,52 18 1,1 0-16,-36-18 47,-88 18-16,105 0-15,-105 0-1,106 0-15,17-17 16,1 17-16,-1 0 16,-17 0 15,-36 0-16,-35 0 1,0 0 0,18 0-1,0 0 1,70 0-16,-52 0 16,-71 0-1,-18 0 1,-35 0-1,123 0-15,-105 0 16,105 0-16,-158-18 16,35-17-1,106 0 1,53 17 0,-1 18-1,-34 0 16,52 0-31,-35 0 16,-17 0 0,34 0-1,19 0 1</inkml:trace>
+</inkml:ink>
 </file>
 
 <file path=ppt/slideLayouts/slideLayout1.xml><?xml version="1.0" encoding="utf-8"?>
@@ -3476,6 +3712,57 @@
           </a:p>
         </p:txBody>
       </p:sp>
+      <mc:AlternateContent xmlns:mc="http://schemas.openxmlformats.org/markup-compatibility/2006">
+        <mc:Choice xmlns:p14="http://schemas.microsoft.com/office/powerpoint/2010/main" Requires="p14">
+          <p:contentPart p14:bwMode="auto" r:id="rId3">
+            <p14:nvContentPartPr>
+              <p14:cNvPr id="5" name="Entrada de lápiz 4">
+                <a:extLst>
+                  <a:ext uri="{FF2B5EF4-FFF2-40B4-BE49-F238E27FC236}">
+                    <a16:creationId xmlns:a16="http://schemas.microsoft.com/office/drawing/2014/main" id="{49A7543D-92E1-7668-C3C3-4AAA73E49DF3}"/>
+                  </a:ext>
+                </a:extLst>
+              </p14:cNvPr>
+              <p14:cNvContentPartPr/>
+              <p14:nvPr/>
+            </p14:nvContentPartPr>
+            <p14:xfrm>
+              <a:off x="7251840" y="4508640"/>
+              <a:ext cx="1022400" cy="1365480"/>
+            </p14:xfrm>
+          </p:contentPart>
+        </mc:Choice>
+        <mc:Fallback>
+          <p:pic>
+            <p:nvPicPr>
+              <p:cNvPr id="5" name="Entrada de lápiz 4">
+                <a:extLst>
+                  <a:ext uri="{FF2B5EF4-FFF2-40B4-BE49-F238E27FC236}">
+                    <a16:creationId xmlns:a16="http://schemas.microsoft.com/office/drawing/2014/main" id="{49A7543D-92E1-7668-C3C3-4AAA73E49DF3}"/>
+                  </a:ext>
+                </a:extLst>
+              </p:cNvPr>
+              <p:cNvPicPr/>
+              <p:nvPr/>
+            </p:nvPicPr>
+            <p:blipFill>
+              <a:blip r:embed="rId4"/>
+              <a:stretch>
+                <a:fillRect/>
+              </a:stretch>
+            </p:blipFill>
+            <p:spPr>
+              <a:xfrm>
+                <a:off x="7242480" y="4499280"/>
+                <a:ext cx="1041120" cy="1384200"/>
+              </a:xfrm>
+              <a:prstGeom prst="rect">
+                <a:avLst/>
+              </a:prstGeom>
+            </p:spPr>
+          </p:pic>
+        </mc:Fallback>
+      </mc:AlternateContent>
     </p:spTree>
   </p:cSld>
   <p:clrMapOvr>
@@ -19268,7 +19555,7 @@
               </a:rPr>
               <a:t>cluster.</a:t>
             </a:r>
-            <a:endParaRPr sz="2400">
+            <a:endParaRPr sz="2400" dirty="0">
               <a:latin typeface="Tahoma"/>
               <a:cs typeface="Tahoma"/>
             </a:endParaRPr>
@@ -19442,7 +19729,7 @@
               </a:rPr>
               <a:t>relaciona.</a:t>
             </a:r>
-            <a:endParaRPr sz="2400">
+            <a:endParaRPr sz="2400" dirty="0">
               <a:latin typeface="Tahoma"/>
               <a:cs typeface="Tahoma"/>
             </a:endParaRPr>
@@ -19496,7 +19783,7 @@
               </a:rPr>
               <a:t> procedimiento.</a:t>
             </a:r>
-            <a:endParaRPr sz="2400">
+            <a:endParaRPr sz="2400" dirty="0">
               <a:latin typeface="Tahoma"/>
               <a:cs typeface="Tahoma"/>
             </a:endParaRPr>
@@ -19670,7 +19957,7 @@
               </a:rPr>
               <a:t>único cluster.</a:t>
             </a:r>
-            <a:endParaRPr sz="2400">
+            <a:endParaRPr sz="2400" dirty="0">
               <a:latin typeface="Tahoma"/>
               <a:cs typeface="Tahoma"/>
             </a:endParaRPr>
@@ -20451,6 +20738,57 @@
           </p:txBody>
         </p:sp>
       </p:grpSp>
+      <mc:AlternateContent xmlns:mc="http://schemas.openxmlformats.org/markup-compatibility/2006">
+        <mc:Choice xmlns:p14="http://schemas.microsoft.com/office/powerpoint/2010/main" Requires="p14">
+          <p:contentPart p14:bwMode="auto" r:id="rId3">
+            <p14:nvContentPartPr>
+              <p14:cNvPr id="7" name="Entrada de lápiz 6">
+                <a:extLst>
+                  <a:ext uri="{FF2B5EF4-FFF2-40B4-BE49-F238E27FC236}">
+                    <a16:creationId xmlns:a16="http://schemas.microsoft.com/office/drawing/2014/main" id="{7F4A9504-7213-243C-C144-6A76BA2A1697}"/>
+                  </a:ext>
+                </a:extLst>
+              </p14:cNvPr>
+              <p14:cNvContentPartPr/>
+              <p14:nvPr/>
+            </p14:nvContentPartPr>
+            <p14:xfrm>
+              <a:off x="3486240" y="3809880"/>
+              <a:ext cx="2419560" cy="2153160"/>
+            </p14:xfrm>
+          </p:contentPart>
+        </mc:Choice>
+        <mc:Fallback>
+          <p:pic>
+            <p:nvPicPr>
+              <p:cNvPr id="7" name="Entrada de lápiz 6">
+                <a:extLst>
+                  <a:ext uri="{FF2B5EF4-FFF2-40B4-BE49-F238E27FC236}">
+                    <a16:creationId xmlns:a16="http://schemas.microsoft.com/office/drawing/2014/main" id="{7F4A9504-7213-243C-C144-6A76BA2A1697}"/>
+                  </a:ext>
+                </a:extLst>
+              </p:cNvPr>
+              <p:cNvPicPr/>
+              <p:nvPr/>
+            </p:nvPicPr>
+            <p:blipFill>
+              <a:blip r:embed="rId4"/>
+              <a:stretch>
+                <a:fillRect/>
+              </a:stretch>
+            </p:blipFill>
+            <p:spPr>
+              <a:xfrm>
+                <a:off x="3476880" y="3800520"/>
+                <a:ext cx="2438280" cy="2171880"/>
+              </a:xfrm>
+              <a:prstGeom prst="rect">
+                <a:avLst/>
+              </a:prstGeom>
+            </p:spPr>
+          </p:pic>
+        </mc:Fallback>
+      </mc:AlternateContent>
     </p:spTree>
   </p:cSld>
   <p:clrMapOvr>
@@ -21998,6 +22336,57 @@
           </a:p>
         </p:txBody>
       </p:sp>
+      <mc:AlternateContent xmlns:mc="http://schemas.openxmlformats.org/markup-compatibility/2006">
+        <mc:Choice xmlns:p14="http://schemas.microsoft.com/office/powerpoint/2010/main" Requires="p14">
+          <p:contentPart p14:bwMode="auto" r:id="rId3">
+            <p14:nvContentPartPr>
+              <p14:cNvPr id="10" name="Entrada de lápiz 9">
+                <a:extLst>
+                  <a:ext uri="{FF2B5EF4-FFF2-40B4-BE49-F238E27FC236}">
+                    <a16:creationId xmlns:a16="http://schemas.microsoft.com/office/drawing/2014/main" id="{068B176C-F9D4-1F5A-62FB-35750383B8CE}"/>
+                  </a:ext>
+                </a:extLst>
+              </p14:cNvPr>
+              <p14:cNvContentPartPr/>
+              <p14:nvPr/>
+            </p14:nvContentPartPr>
+            <p14:xfrm>
+              <a:off x="4997520" y="2050920"/>
+              <a:ext cx="5975640" cy="2178720"/>
+            </p14:xfrm>
+          </p:contentPart>
+        </mc:Choice>
+        <mc:Fallback>
+          <p:pic>
+            <p:nvPicPr>
+              <p:cNvPr id="10" name="Entrada de lápiz 9">
+                <a:extLst>
+                  <a:ext uri="{FF2B5EF4-FFF2-40B4-BE49-F238E27FC236}">
+                    <a16:creationId xmlns:a16="http://schemas.microsoft.com/office/drawing/2014/main" id="{068B176C-F9D4-1F5A-62FB-35750383B8CE}"/>
+                  </a:ext>
+                </a:extLst>
+              </p:cNvPr>
+              <p:cNvPicPr/>
+              <p:nvPr/>
+            </p:nvPicPr>
+            <p:blipFill>
+              <a:blip r:embed="rId4"/>
+              <a:stretch>
+                <a:fillRect/>
+              </a:stretch>
+            </p:blipFill>
+            <p:spPr>
+              <a:xfrm>
+                <a:off x="4988160" y="2041560"/>
+                <a:ext cx="5994360" cy="2197440"/>
+              </a:xfrm>
+              <a:prstGeom prst="rect">
+                <a:avLst/>
+              </a:prstGeom>
+            </p:spPr>
+          </p:pic>
+        </mc:Fallback>
+      </mc:AlternateContent>
     </p:spTree>
   </p:cSld>
   <p:clrMapOvr>
@@ -22007,6 +22396,523 @@
 </file>
 
 <file path=ppt/slides/slide25.xml><?xml version="1.0" encoding="utf-8"?>
+<p:sld xmlns:a="http://schemas.openxmlformats.org/drawingml/2006/main" xmlns:r="http://schemas.openxmlformats.org/officeDocument/2006/relationships" xmlns:p="http://schemas.openxmlformats.org/presentationml/2006/main">
+  <p:cSld>
+    <p:spTree>
+      <p:nvGrpSpPr>
+        <p:cNvPr id="1" name=""/>
+        <p:cNvGrpSpPr/>
+        <p:nvPr/>
+      </p:nvGrpSpPr>
+      <p:grpSpPr>
+        <a:xfrm>
+          <a:off x="0" y="0"/>
+          <a:ext cx="0" cy="0"/>
+          <a:chOff x="0" y="0"/>
+          <a:chExt cx="0" cy="0"/>
+        </a:xfrm>
+      </p:grpSpPr>
+      <p:grpSp>
+        <p:nvGrpSpPr>
+          <p:cNvPr id="2" name="object 2"/>
+          <p:cNvGrpSpPr/>
+          <p:nvPr/>
+        </p:nvGrpSpPr>
+        <p:grpSpPr>
+          <a:xfrm>
+            <a:off x="0" y="0"/>
+            <a:ext cx="12192000" cy="6136005"/>
+            <a:chOff x="0" y="0"/>
+            <a:chExt cx="12192000" cy="6136005"/>
+          </a:xfrm>
+        </p:grpSpPr>
+        <p:pic>
+          <p:nvPicPr>
+            <p:cNvPr id="3" name="object 3"/>
+            <p:cNvPicPr/>
+            <p:nvPr/>
+          </p:nvPicPr>
+          <p:blipFill>
+            <a:blip r:embed="rId2" cstate="print"/>
+            <a:stretch>
+              <a:fillRect/>
+            </a:stretch>
+          </p:blipFill>
+          <p:spPr>
+            <a:xfrm>
+              <a:off x="0" y="0"/>
+              <a:ext cx="12191999" cy="5599655"/>
+            </a:xfrm>
+            <a:prstGeom prst="rect">
+              <a:avLst/>
+            </a:prstGeom>
+          </p:spPr>
+        </p:pic>
+        <p:sp>
+          <p:nvSpPr>
+            <p:cNvPr id="4" name="object 4"/>
+            <p:cNvSpPr/>
+            <p:nvPr/>
+          </p:nvSpPr>
+          <p:spPr>
+            <a:xfrm>
+              <a:off x="9959340" y="1498091"/>
+              <a:ext cx="2232660" cy="4638040"/>
+            </a:xfrm>
+            <a:custGeom>
+              <a:avLst/>
+              <a:gdLst/>
+              <a:ahLst/>
+              <a:cxnLst/>
+              <a:rect l="l" t="t" r="r" b="b"/>
+              <a:pathLst>
+                <a:path w="2232659" h="4638040">
+                  <a:moveTo>
+                    <a:pt x="0" y="4637532"/>
+                  </a:moveTo>
+                  <a:lnTo>
+                    <a:pt x="2232659" y="4637532"/>
+                  </a:lnTo>
+                  <a:lnTo>
+                    <a:pt x="2232659" y="0"/>
+                  </a:lnTo>
+                  <a:lnTo>
+                    <a:pt x="0" y="0"/>
+                  </a:lnTo>
+                  <a:lnTo>
+                    <a:pt x="0" y="4637532"/>
+                  </a:lnTo>
+                  <a:close/>
+                </a:path>
+              </a:pathLst>
+            </a:custGeom>
+            <a:solidFill>
+              <a:srgbClr val="FFFFFF">
+                <a:alpha val="67842"/>
+              </a:srgbClr>
+            </a:solidFill>
+          </p:spPr>
+          <p:txBody>
+            <a:bodyPr wrap="square" lIns="0" tIns="0" rIns="0" bIns="0" rtlCol="0"/>
+            <a:lstStyle/>
+            <a:p>
+              <a:endParaRPr/>
+            </a:p>
+          </p:txBody>
+        </p:sp>
+      </p:grpSp>
+      <p:sp>
+        <p:nvSpPr>
+          <p:cNvPr id="5" name="object 5"/>
+          <p:cNvSpPr txBox="1">
+            <a:spLocks noGrp="1"/>
+          </p:cNvSpPr>
+          <p:nvPr>
+            <p:ph type="title"/>
+          </p:nvPr>
+        </p:nvSpPr>
+        <p:spPr>
+          <a:xfrm>
+            <a:off x="825500" y="478027"/>
+            <a:ext cx="10541000" cy="505908"/>
+          </a:xfrm>
+          <a:prstGeom prst="rect">
+            <a:avLst/>
+          </a:prstGeom>
+        </p:spPr>
+        <p:txBody>
+          <a:bodyPr vert="horz" wrap="square" lIns="0" tIns="13335" rIns="0" bIns="0" rtlCol="0">
+            <a:spAutoFit/>
+          </a:bodyPr>
+          <a:lstStyle/>
+          <a:p>
+            <a:pPr marL="12700">
+              <a:lnSpc>
+                <a:spcPct val="100000"/>
+              </a:lnSpc>
+              <a:spcBef>
+                <a:spcPts val="105"/>
+              </a:spcBef>
+            </a:pPr>
+            <a:r>
+              <a:rPr lang="es-PE" sz="3200" dirty="0">
+                <a:solidFill>
+                  <a:srgbClr val="FFFFFF"/>
+                </a:solidFill>
+              </a:rPr>
+              <a:t>TRABAJO PRACTICO:</a:t>
+            </a:r>
+            <a:endParaRPr sz="3200" dirty="0"/>
+          </a:p>
+        </p:txBody>
+      </p:sp>
+      <p:sp>
+        <p:nvSpPr>
+          <p:cNvPr id="7" name="object 7"/>
+          <p:cNvSpPr txBox="1">
+            <a:spLocks noGrp="1"/>
+          </p:cNvSpPr>
+          <p:nvPr>
+            <p:ph type="body" idx="1"/>
+          </p:nvPr>
+        </p:nvSpPr>
+        <p:spPr>
+          <a:xfrm>
+            <a:off x="4955822" y="1489046"/>
+            <a:ext cx="6656705" cy="3879908"/>
+          </a:xfrm>
+          <a:prstGeom prst="rect">
+            <a:avLst/>
+          </a:prstGeom>
+        </p:spPr>
+        <p:txBody>
+          <a:bodyPr vert="horz" wrap="square" lIns="0" tIns="12065" rIns="0" bIns="0" rtlCol="0">
+            <a:spAutoFit/>
+          </a:bodyPr>
+          <a:lstStyle/>
+          <a:p>
+            <a:pPr marL="299085" marR="5080" algn="just">
+              <a:lnSpc>
+                <a:spcPct val="100000"/>
+              </a:lnSpc>
+              <a:spcBef>
+                <a:spcPts val="95"/>
+              </a:spcBef>
+            </a:pPr>
+            <a:r>
+              <a:rPr lang="es-PE" sz="2400" dirty="0"/>
+              <a:t>Utilizar el </a:t>
+            </a:r>
+            <a:r>
+              <a:rPr lang="es-PE" sz="2400" dirty="0" err="1"/>
+              <a:t>dataset</a:t>
+            </a:r>
+            <a:r>
+              <a:rPr lang="es-PE" sz="2400" dirty="0"/>
+              <a:t> </a:t>
+            </a:r>
+            <a:r>
+              <a:rPr lang="es-PE" sz="2400" dirty="0" err="1"/>
+              <a:t>penguins</a:t>
+            </a:r>
+            <a:r>
+              <a:rPr lang="es-PE" sz="2400" dirty="0"/>
+              <a:t> palmer, realizar un análisis de </a:t>
+            </a:r>
+            <a:r>
+              <a:rPr lang="es-PE" sz="2400" dirty="0" err="1"/>
+              <a:t>clusterizacion</a:t>
+            </a:r>
+            <a:r>
+              <a:rPr lang="es-PE" sz="2400" dirty="0"/>
+              <a:t> y responder a la pregunta:</a:t>
+            </a:r>
+          </a:p>
+          <a:p>
+            <a:pPr marL="299085" marR="5080" algn="just">
+              <a:lnSpc>
+                <a:spcPct val="100000"/>
+              </a:lnSpc>
+              <a:spcBef>
+                <a:spcPts val="95"/>
+              </a:spcBef>
+            </a:pPr>
+            <a:endParaRPr lang="es-PE" sz="2400" dirty="0"/>
+          </a:p>
+          <a:p>
+            <a:pPr marL="299085" marR="5080" algn="just">
+              <a:lnSpc>
+                <a:spcPct val="100000"/>
+              </a:lnSpc>
+              <a:spcBef>
+                <a:spcPts val="95"/>
+              </a:spcBef>
+            </a:pPr>
+            <a:r>
+              <a:rPr lang="es-PE" sz="1600" dirty="0">
+                <a:hlinkClick r:id="rId3"/>
+              </a:rPr>
+              <a:t>gist.githubusercontent.com/</a:t>
+            </a:r>
+            <a:r>
+              <a:rPr lang="es-PE" sz="1600" dirty="0" err="1">
+                <a:hlinkClick r:id="rId3"/>
+              </a:rPr>
+              <a:t>slopp</a:t>
+            </a:r>
+            <a:r>
+              <a:rPr lang="es-PE" sz="1600" dirty="0">
+                <a:hlinkClick r:id="rId3"/>
+              </a:rPr>
+              <a:t>/ce3b90b9168f2f921784de84fa445651/raw/4ecf3041f0ed4913e7c230758733948bc561f434/penguins.csv</a:t>
+            </a:r>
+            <a:endParaRPr lang="es-PE" sz="1600" dirty="0"/>
+          </a:p>
+          <a:p>
+            <a:pPr marL="299085" marR="5080" algn="just">
+              <a:lnSpc>
+                <a:spcPct val="100000"/>
+              </a:lnSpc>
+              <a:spcBef>
+                <a:spcPts val="95"/>
+              </a:spcBef>
+            </a:pPr>
+            <a:endParaRPr lang="es-PE" sz="2400" spc="-10" dirty="0"/>
+          </a:p>
+          <a:p>
+            <a:pPr marL="299085" marR="5080" algn="just">
+              <a:lnSpc>
+                <a:spcPct val="100000"/>
+              </a:lnSpc>
+              <a:spcBef>
+                <a:spcPts val="95"/>
+              </a:spcBef>
+            </a:pPr>
+            <a:r>
+              <a:rPr lang="es-PE" sz="2400" b="1" spc="-10" dirty="0"/>
+              <a:t>El </a:t>
+            </a:r>
+            <a:r>
+              <a:rPr lang="es-PE" sz="2400" b="1" spc="-10" dirty="0" err="1"/>
+              <a:t>dataset</a:t>
+            </a:r>
+            <a:r>
+              <a:rPr lang="es-PE" sz="2400" b="1" spc="-10" dirty="0"/>
+              <a:t> define tres especies, pero según sus características un modelo de </a:t>
+            </a:r>
+            <a:r>
+              <a:rPr lang="es-PE" sz="2400" b="1" spc="-10" dirty="0" err="1"/>
+              <a:t>cluster</a:t>
+            </a:r>
+            <a:r>
+              <a:rPr lang="es-PE" sz="2400" b="1" spc="-10" dirty="0"/>
+              <a:t>, ¿define bien estos 3 grupos de especies de </a:t>
+            </a:r>
+            <a:r>
+              <a:rPr lang="es-PE" sz="2400" b="1" spc="-10" dirty="0" err="1"/>
+              <a:t>pinguinos</a:t>
+            </a:r>
+            <a:r>
+              <a:rPr lang="es-PE" sz="2400" b="1" spc="-10" dirty="0"/>
+              <a:t>?</a:t>
+            </a:r>
+            <a:endParaRPr sz="2400" b="1" spc="-10" dirty="0"/>
+          </a:p>
+        </p:txBody>
+      </p:sp>
+      <p:pic>
+        <p:nvPicPr>
+          <p:cNvPr id="1026" name="Picture 2" descr="Palmer Penguins | Kaggle">
+            <a:extLst>
+              <a:ext uri="{FF2B5EF4-FFF2-40B4-BE49-F238E27FC236}">
+                <a16:creationId xmlns:a16="http://schemas.microsoft.com/office/drawing/2014/main" id="{1A49522C-38D0-1047-2AC4-CA34828B4763}"/>
+              </a:ext>
+            </a:extLst>
+          </p:cNvPr>
+          <p:cNvPicPr>
+            <a:picLocks noChangeAspect="1" noChangeArrowheads="1"/>
+          </p:cNvPicPr>
+          <p:nvPr/>
+        </p:nvPicPr>
+        <p:blipFill>
+          <a:blip r:embed="rId4" cstate="print">
+            <a:extLst>
+              <a:ext uri="{28A0092B-C50C-407E-A947-70E740481C1C}">
+                <a14:useLocalDpi xmlns:a14="http://schemas.microsoft.com/office/drawing/2010/main" val="0"/>
+              </a:ext>
+            </a:extLst>
+          </a:blip>
+          <a:srcRect/>
+          <a:stretch>
+            <a:fillRect/>
+          </a:stretch>
+        </p:blipFill>
+        <p:spPr bwMode="auto">
+          <a:xfrm>
+            <a:off x="51393" y="1259317"/>
+            <a:ext cx="5108222" cy="3048000"/>
+          </a:xfrm>
+          <a:prstGeom prst="rect">
+            <a:avLst/>
+          </a:prstGeom>
+          <a:noFill/>
+          <a:extLst>
+            <a:ext uri="{909E8E84-426E-40DD-AFC4-6F175D3DCCD1}">
+              <a14:hiddenFill xmlns:a14="http://schemas.microsoft.com/office/drawing/2010/main">
+                <a:solidFill>
+                  <a:srgbClr val="FFFFFF"/>
+                </a:solidFill>
+              </a14:hiddenFill>
+            </a:ext>
+          </a:extLst>
+        </p:spPr>
+      </p:pic>
+      <p:sp>
+        <p:nvSpPr>
+          <p:cNvPr id="8" name="object 3">
+            <a:extLst>
+              <a:ext uri="{FF2B5EF4-FFF2-40B4-BE49-F238E27FC236}">
+                <a16:creationId xmlns:a16="http://schemas.microsoft.com/office/drawing/2014/main" id="{CF42698B-C91B-5644-A19D-4825D282F59F}"/>
+              </a:ext>
+            </a:extLst>
+          </p:cNvPr>
+          <p:cNvSpPr txBox="1"/>
+          <p:nvPr/>
+        </p:nvSpPr>
+        <p:spPr>
+          <a:xfrm>
+            <a:off x="5486400" y="5760387"/>
+            <a:ext cx="6248400" cy="751488"/>
+          </a:xfrm>
+          <a:prstGeom prst="rect">
+            <a:avLst/>
+          </a:prstGeom>
+        </p:spPr>
+        <p:txBody>
+          <a:bodyPr vert="horz" wrap="square" lIns="0" tIns="12700" rIns="0" bIns="0" rtlCol="0">
+            <a:spAutoFit/>
+          </a:bodyPr>
+          <a:lstStyle/>
+          <a:p>
+            <a:pPr marL="12700" marR="6350" algn="just">
+              <a:lnSpc>
+                <a:spcPct val="100000"/>
+              </a:lnSpc>
+              <a:spcBef>
+                <a:spcPts val="100"/>
+              </a:spcBef>
+            </a:pPr>
+            <a:r>
+              <a:rPr lang="es-PE" sz="2400" dirty="0">
+                <a:solidFill>
+                  <a:srgbClr val="440099"/>
+                </a:solidFill>
+                <a:latin typeface="Tahoma"/>
+                <a:cs typeface="Tahoma"/>
+              </a:rPr>
+              <a:t>FECHA DE ENTREGA: 29/01/2024 8:00PM</a:t>
+            </a:r>
+            <a:br>
+              <a:rPr lang="es-PE" sz="2400" dirty="0">
+                <a:solidFill>
+                  <a:srgbClr val="440099"/>
+                </a:solidFill>
+                <a:latin typeface="Tahoma"/>
+                <a:cs typeface="Tahoma"/>
+              </a:rPr>
+            </a:br>
+            <a:r>
+              <a:rPr lang="es-PE" sz="2400" dirty="0">
+                <a:solidFill>
+                  <a:srgbClr val="440099"/>
+                </a:solidFill>
+                <a:latin typeface="Tahoma"/>
+                <a:cs typeface="Tahoma"/>
+              </a:rPr>
+              <a:t>ENTREGARLO EN UN NOTEBOOK DE PYTHON</a:t>
+            </a:r>
+            <a:endParaRPr sz="2400" dirty="0">
+              <a:latin typeface="Tahoma"/>
+              <a:cs typeface="Tahoma"/>
+            </a:endParaRPr>
+          </a:p>
+        </p:txBody>
+      </p:sp>
+      <p:pic>
+        <p:nvPicPr>
+          <p:cNvPr id="9" name="Imagen 8">
+            <a:extLst>
+              <a:ext uri="{FF2B5EF4-FFF2-40B4-BE49-F238E27FC236}">
+                <a16:creationId xmlns:a16="http://schemas.microsoft.com/office/drawing/2014/main" id="{0BFE6CEE-AF6C-D73B-323C-BFB81C9F7594}"/>
+              </a:ext>
+            </a:extLst>
+          </p:cNvPr>
+          <p:cNvPicPr>
+            <a:picLocks noChangeAspect="1"/>
+          </p:cNvPicPr>
+          <p:nvPr/>
+        </p:nvPicPr>
+        <p:blipFill>
+          <a:blip r:embed="rId5"/>
+          <a:stretch>
+            <a:fillRect/>
+          </a:stretch>
+        </p:blipFill>
+        <p:spPr>
+          <a:xfrm>
+            <a:off x="1097487" y="4285066"/>
+            <a:ext cx="2913245" cy="2560742"/>
+          </a:xfrm>
+          <a:prstGeom prst="rect">
+            <a:avLst/>
+          </a:prstGeom>
+        </p:spPr>
+      </p:pic>
+      <mc:AlternateContent xmlns:mc="http://schemas.openxmlformats.org/markup-compatibility/2006">
+        <mc:Choice xmlns:p14="http://schemas.microsoft.com/office/powerpoint/2010/main" Requires="p14">
+          <p:contentPart p14:bwMode="auto" r:id="rId6">
+            <p14:nvContentPartPr>
+              <p14:cNvPr id="10" name="Entrada de lápiz 9">
+                <a:extLst>
+                  <a:ext uri="{FF2B5EF4-FFF2-40B4-BE49-F238E27FC236}">
+                    <a16:creationId xmlns:a16="http://schemas.microsoft.com/office/drawing/2014/main" id="{5ED8A8DC-9710-99AE-4927-AF2C02D35A7D}"/>
+                  </a:ext>
+                </a:extLst>
+              </p14:cNvPr>
+              <p14:cNvContentPartPr/>
+              <p14:nvPr/>
+            </p14:nvContentPartPr>
+            <p14:xfrm>
+              <a:off x="882720" y="4095720"/>
+              <a:ext cx="3626280" cy="165600"/>
+            </p14:xfrm>
+          </p:contentPart>
+        </mc:Choice>
+        <mc:Fallback>
+          <p:pic>
+            <p:nvPicPr>
+              <p:cNvPr id="10" name="Entrada de lápiz 9">
+                <a:extLst>
+                  <a:ext uri="{FF2B5EF4-FFF2-40B4-BE49-F238E27FC236}">
+                    <a16:creationId xmlns:a16="http://schemas.microsoft.com/office/drawing/2014/main" id="{5ED8A8DC-9710-99AE-4927-AF2C02D35A7D}"/>
+                  </a:ext>
+                </a:extLst>
+              </p:cNvPr>
+              <p:cNvPicPr/>
+              <p:nvPr/>
+            </p:nvPicPr>
+            <p:blipFill>
+              <a:blip r:embed="rId7"/>
+              <a:stretch>
+                <a:fillRect/>
+              </a:stretch>
+            </p:blipFill>
+            <p:spPr>
+              <a:xfrm>
+                <a:off x="873360" y="4086360"/>
+                <a:ext cx="3645000" cy="184320"/>
+              </a:xfrm>
+              <a:prstGeom prst="rect">
+                <a:avLst/>
+              </a:prstGeom>
+            </p:spPr>
+          </p:pic>
+        </mc:Fallback>
+      </mc:AlternateContent>
+    </p:spTree>
+    <p:extLst>
+      <p:ext uri="{BB962C8B-B14F-4D97-AF65-F5344CB8AC3E}">
+        <p14:creationId xmlns:p14="http://schemas.microsoft.com/office/powerpoint/2010/main" val="3488745573"/>
+      </p:ext>
+    </p:extLst>
+  </p:cSld>
+  <p:clrMapOvr>
+    <a:masterClrMapping/>
+  </p:clrMapOvr>
+</p:sld>
+</file>
+
+<file path=ppt/slides/slide26.xml><?xml version="1.0" encoding="utf-8"?>
 <p:sld xmlns:a="http://schemas.openxmlformats.org/drawingml/2006/main" xmlns:r="http://schemas.openxmlformats.org/officeDocument/2006/relationships" xmlns:p="http://schemas.openxmlformats.org/presentationml/2006/main">
   <p:cSld>
     <p:spTree>
@@ -23354,7 +24260,7 @@
 </p:sld>
 </file>
 
-<file path=ppt/slides/slide26.xml><?xml version="1.0" encoding="utf-8"?>
+<file path=ppt/slides/slide27.xml><?xml version="1.0" encoding="utf-8"?>
 <p:sld xmlns:a="http://schemas.openxmlformats.org/drawingml/2006/main" xmlns:r="http://schemas.openxmlformats.org/officeDocument/2006/relationships" xmlns:p="http://schemas.openxmlformats.org/presentationml/2006/main">
   <p:cSld>
     <p:spTree>
@@ -24646,7 +25552,7 @@
 </p:sld>
 </file>
 
-<file path=ppt/slides/slide27.xml><?xml version="1.0" encoding="utf-8"?>
+<file path=ppt/slides/slide28.xml><?xml version="1.0" encoding="utf-8"?>
 <p:sld xmlns:a="http://schemas.openxmlformats.org/drawingml/2006/main" xmlns:r="http://schemas.openxmlformats.org/officeDocument/2006/relationships" xmlns:p="http://schemas.openxmlformats.org/presentationml/2006/main">
   <p:cSld>
     <p:spTree>
@@ -25451,7 +26357,7 @@
 </p:sld>
 </file>
 
-<file path=ppt/slides/slide28.xml><?xml version="1.0" encoding="utf-8"?>
+<file path=ppt/slides/slide29.xml><?xml version="1.0" encoding="utf-8"?>
 <p:sld xmlns:a="http://schemas.openxmlformats.org/drawingml/2006/main" xmlns:r="http://schemas.openxmlformats.org/officeDocument/2006/relationships" xmlns:p="http://schemas.openxmlformats.org/presentationml/2006/main" showMasterSp="0">
   <p:cSld>
     <p:spTree>
@@ -30088,6 +30994,57 @@
           </a:p>
         </p:txBody>
       </p:sp>
+      <mc:AlternateContent xmlns:mc="http://schemas.openxmlformats.org/markup-compatibility/2006">
+        <mc:Choice xmlns:p14="http://schemas.microsoft.com/office/powerpoint/2010/main" Requires="p14">
+          <p:contentPart p14:bwMode="auto" r:id="rId3">
+            <p14:nvContentPartPr>
+              <p14:cNvPr id="11" name="Entrada de lápiz 10">
+                <a:extLst>
+                  <a:ext uri="{FF2B5EF4-FFF2-40B4-BE49-F238E27FC236}">
+                    <a16:creationId xmlns:a16="http://schemas.microsoft.com/office/drawing/2014/main" id="{EE2E854D-C472-C1F9-290D-524EAA37D80D}"/>
+                  </a:ext>
+                </a:extLst>
+              </p14:cNvPr>
+              <p14:cNvContentPartPr/>
+              <p14:nvPr/>
+            </p14:nvContentPartPr>
+            <p14:xfrm>
+              <a:off x="1238400" y="3314880"/>
+              <a:ext cx="10947600" cy="2571840"/>
+            </p14:xfrm>
+          </p:contentPart>
+        </mc:Choice>
+        <mc:Fallback>
+          <p:pic>
+            <p:nvPicPr>
+              <p:cNvPr id="11" name="Entrada de lápiz 10">
+                <a:extLst>
+                  <a:ext uri="{FF2B5EF4-FFF2-40B4-BE49-F238E27FC236}">
+                    <a16:creationId xmlns:a16="http://schemas.microsoft.com/office/drawing/2014/main" id="{EE2E854D-C472-C1F9-290D-524EAA37D80D}"/>
+                  </a:ext>
+                </a:extLst>
+              </p:cNvPr>
+              <p:cNvPicPr/>
+              <p:nvPr/>
+            </p:nvPicPr>
+            <p:blipFill>
+              <a:blip r:embed="rId4"/>
+              <a:stretch>
+                <a:fillRect/>
+              </a:stretch>
+            </p:blipFill>
+            <p:spPr>
+              <a:xfrm>
+                <a:off x="1229040" y="3305520"/>
+                <a:ext cx="10966320" cy="2590560"/>
+              </a:xfrm>
+              <a:prstGeom prst="rect">
+                <a:avLst/>
+              </a:prstGeom>
+            </p:spPr>
+          </p:pic>
+        </mc:Fallback>
+      </mc:AlternateContent>
     </p:spTree>
   </p:cSld>
   <p:clrMapOvr>
@@ -31606,6 +32563,57 @@
           </a:p>
         </p:txBody>
       </p:sp>
+      <mc:AlternateContent xmlns:mc="http://schemas.openxmlformats.org/markup-compatibility/2006">
+        <mc:Choice xmlns:p14="http://schemas.microsoft.com/office/powerpoint/2010/main" Requires="p14">
+          <p:contentPart p14:bwMode="auto" r:id="rId4">
+            <p14:nvContentPartPr>
+              <p14:cNvPr id="8" name="Entrada de lápiz 7">
+                <a:extLst>
+                  <a:ext uri="{FF2B5EF4-FFF2-40B4-BE49-F238E27FC236}">
+                    <a16:creationId xmlns:a16="http://schemas.microsoft.com/office/drawing/2014/main" id="{70E1F502-3AEC-41EC-8565-63CB70102322}"/>
+                  </a:ext>
+                </a:extLst>
+              </p14:cNvPr>
+              <p14:cNvContentPartPr/>
+              <p14:nvPr/>
+            </p14:nvContentPartPr>
+            <p14:xfrm>
+              <a:off x="2146320" y="2273400"/>
+              <a:ext cx="2394360" cy="2934000"/>
+            </p14:xfrm>
+          </p:contentPart>
+        </mc:Choice>
+        <mc:Fallback>
+          <p:pic>
+            <p:nvPicPr>
+              <p:cNvPr id="8" name="Entrada de lápiz 7">
+                <a:extLst>
+                  <a:ext uri="{FF2B5EF4-FFF2-40B4-BE49-F238E27FC236}">
+                    <a16:creationId xmlns:a16="http://schemas.microsoft.com/office/drawing/2014/main" id="{70E1F502-3AEC-41EC-8565-63CB70102322}"/>
+                  </a:ext>
+                </a:extLst>
+              </p:cNvPr>
+              <p:cNvPicPr/>
+              <p:nvPr/>
+            </p:nvPicPr>
+            <p:blipFill>
+              <a:blip r:embed="rId5"/>
+              <a:stretch>
+                <a:fillRect/>
+              </a:stretch>
+            </p:blipFill>
+            <p:spPr>
+              <a:xfrm>
+                <a:off x="2136960" y="2264040"/>
+                <a:ext cx="2413080" cy="2952720"/>
+              </a:xfrm>
+              <a:prstGeom prst="rect">
+                <a:avLst/>
+              </a:prstGeom>
+            </p:spPr>
+          </p:pic>
+        </mc:Fallback>
+      </mc:AlternateContent>
     </p:spTree>
   </p:cSld>
   <p:clrMapOvr>
@@ -31879,6 +32887,57 @@
           </a:prstGeom>
         </p:spPr>
       </p:pic>
+      <mc:AlternateContent xmlns:mc="http://schemas.openxmlformats.org/markup-compatibility/2006">
+        <mc:Choice xmlns:p14="http://schemas.microsoft.com/office/powerpoint/2010/main" Requires="p14">
+          <p:contentPart p14:bwMode="auto" r:id="rId4">
+            <p14:nvContentPartPr>
+              <p14:cNvPr id="8" name="Entrada de lápiz 7">
+                <a:extLst>
+                  <a:ext uri="{FF2B5EF4-FFF2-40B4-BE49-F238E27FC236}">
+                    <a16:creationId xmlns:a16="http://schemas.microsoft.com/office/drawing/2014/main" id="{CF04F38E-5557-74C2-D6FB-61F21480C8A6}"/>
+                  </a:ext>
+                </a:extLst>
+              </p14:cNvPr>
+              <p14:cNvContentPartPr/>
+              <p14:nvPr/>
+            </p14:nvContentPartPr>
+            <p14:xfrm>
+              <a:off x="1949400" y="2095560"/>
+              <a:ext cx="8172720" cy="3461040"/>
+            </p14:xfrm>
+          </p:contentPart>
+        </mc:Choice>
+        <mc:Fallback>
+          <p:pic>
+            <p:nvPicPr>
+              <p:cNvPr id="8" name="Entrada de lápiz 7">
+                <a:extLst>
+                  <a:ext uri="{FF2B5EF4-FFF2-40B4-BE49-F238E27FC236}">
+                    <a16:creationId xmlns:a16="http://schemas.microsoft.com/office/drawing/2014/main" id="{CF04F38E-5557-74C2-D6FB-61F21480C8A6}"/>
+                  </a:ext>
+                </a:extLst>
+              </p:cNvPr>
+              <p:cNvPicPr/>
+              <p:nvPr/>
+            </p:nvPicPr>
+            <p:blipFill>
+              <a:blip r:embed="rId5"/>
+              <a:stretch>
+                <a:fillRect/>
+              </a:stretch>
+            </p:blipFill>
+            <p:spPr>
+              <a:xfrm>
+                <a:off x="1940040" y="2086200"/>
+                <a:ext cx="8191440" cy="3479760"/>
+              </a:xfrm>
+              <a:prstGeom prst="rect">
+                <a:avLst/>
+              </a:prstGeom>
+            </p:spPr>
+          </p:pic>
+        </mc:Fallback>
+      </mc:AlternateContent>
     </p:spTree>
   </p:cSld>
   <p:clrMapOvr>

</xml_diff>